<commit_message>
New sys query April 2016 + VBA function
</commit_message>
<xml_diff>
--- a/sys_NestVisitsSummary.pptx
+++ b/sys_NestVisitsSummary.pptx
@@ -1105,11 +1105,20 @@
         <a:bodyPr/>
         <a:lstStyle/>
         <a:p>
+          <a:pPr algn="ctr"/>
           <a:r>
             <a:rPr lang="en-US" sz="1400" b="1" dirty="0" err="1" smtClean="0"/>
             <a:t>NestVisitOverlap</a:t>
           </a:r>
-          <a:endParaRPr lang="en-US" sz="1400" b="1" dirty="0"/>
+          <a:endParaRPr lang="en-US" sz="1400" b="1" dirty="0" smtClean="0"/>
+        </a:p>
+        <a:p>
+          <a:pPr algn="l"/>
+          <a:r>
+            <a:rPr lang="en-US" sz="1200" b="0" dirty="0" smtClean="0"/>
+            <a:t>-Needs VBA function</a:t>
+          </a:r>
+          <a:endParaRPr lang="en-US" sz="1200" b="0" dirty="0"/>
         </a:p>
       </dgm:t>
     </dgm:pt>
@@ -1777,6 +1786,13 @@
     <dgm:pt modelId="{A4009376-3652-4230-A4A8-00177C029550}" type="pres">
       <dgm:prSet presAssocID="{8AA9C7FB-F78D-4148-9370-C08F5FBBB4D8}" presName="Name64" presStyleLbl="parChTrans1D3" presStyleIdx="0" presStyleCnt="5"/>
       <dgm:spPr/>
+      <dgm:t>
+        <a:bodyPr/>
+        <a:lstStyle/>
+        <a:p>
+          <a:endParaRPr lang="en-US"/>
+        </a:p>
+      </dgm:t>
     </dgm:pt>
     <dgm:pt modelId="{FFBC709C-C49B-469B-B40C-62C89D82EBEE}" type="pres">
       <dgm:prSet presAssocID="{6956A6E1-FFF9-46E7-8408-50A1E09DBB2A}" presName="hierRoot2" presStyleCnt="0">
@@ -1831,6 +1847,13 @@
     <dgm:pt modelId="{7DB32FB0-B1FE-479C-ABAD-9BFF92FD762B}" type="pres">
       <dgm:prSet presAssocID="{7C9DDF55-A9A0-4323-B06E-427F82A2F6D2}" presName="Name64" presStyleLbl="parChTrans1D2" presStyleIdx="2" presStyleCnt="5"/>
       <dgm:spPr/>
+      <dgm:t>
+        <a:bodyPr/>
+        <a:lstStyle/>
+        <a:p>
+          <a:endParaRPr lang="en-US"/>
+        </a:p>
+      </dgm:t>
     </dgm:pt>
     <dgm:pt modelId="{E3DF9A97-BEBD-4690-A320-6B233822E03C}" type="pres">
       <dgm:prSet presAssocID="{B790851C-B0C6-410E-A59E-486430AB8981}" presName="hierRoot2" presStyleCnt="0">
@@ -1862,6 +1885,13 @@
     <dgm:pt modelId="{28EDBAFB-A8C2-4256-824E-38FCE77CBDCE}" type="pres">
       <dgm:prSet presAssocID="{B790851C-B0C6-410E-A59E-486430AB8981}" presName="rootConnector" presStyleLbl="node2" presStyleIdx="2" presStyleCnt="5"/>
       <dgm:spPr/>
+      <dgm:t>
+        <a:bodyPr/>
+        <a:lstStyle/>
+        <a:p>
+          <a:endParaRPr lang="en-US"/>
+        </a:p>
+      </dgm:t>
     </dgm:pt>
     <dgm:pt modelId="{7D6CC5FF-BE08-47DE-B0B4-41A9D1685D36}" type="pres">
       <dgm:prSet presAssocID="{B790851C-B0C6-410E-A59E-486430AB8981}" presName="hierChild4" presStyleCnt="0"/>
@@ -1870,6 +1900,13 @@
     <dgm:pt modelId="{7E2CC93C-EC34-4B42-9500-E51920FBD042}" type="pres">
       <dgm:prSet presAssocID="{68C308F2-8621-4026-BFBD-AF4B69F59443}" presName="Name64" presStyleLbl="parChTrans1D3" presStyleIdx="1" presStyleCnt="5"/>
       <dgm:spPr/>
+      <dgm:t>
+        <a:bodyPr/>
+        <a:lstStyle/>
+        <a:p>
+          <a:endParaRPr lang="en-US"/>
+        </a:p>
+      </dgm:t>
     </dgm:pt>
     <dgm:pt modelId="{C0DF0304-ECA2-499D-AE8D-5A7BD35D019D}" type="pres">
       <dgm:prSet presAssocID="{DE7AFE1B-E420-469B-A239-2BC7B687EB5A}" presName="hierRoot2" presStyleCnt="0">
@@ -1890,10 +1927,24 @@
         </dgm:presLayoutVars>
       </dgm:prSet>
       <dgm:spPr/>
+      <dgm:t>
+        <a:bodyPr/>
+        <a:lstStyle/>
+        <a:p>
+          <a:endParaRPr lang="en-US"/>
+        </a:p>
+      </dgm:t>
     </dgm:pt>
     <dgm:pt modelId="{08BB4427-5B1C-46AD-B6DA-939C7A309B74}" type="pres">
       <dgm:prSet presAssocID="{DE7AFE1B-E420-469B-A239-2BC7B687EB5A}" presName="rootConnector" presStyleLbl="node3" presStyleIdx="1" presStyleCnt="5"/>
       <dgm:spPr/>
+      <dgm:t>
+        <a:bodyPr/>
+        <a:lstStyle/>
+        <a:p>
+          <a:endParaRPr lang="en-US"/>
+        </a:p>
+      </dgm:t>
     </dgm:pt>
     <dgm:pt modelId="{C102A104-3518-47AB-851A-7D7D5AED1CE2}" type="pres">
       <dgm:prSet presAssocID="{DE7AFE1B-E420-469B-A239-2BC7B687EB5A}" presName="hierChild4" presStyleCnt="0"/>
@@ -1902,6 +1953,13 @@
     <dgm:pt modelId="{70C69F3D-6797-463F-932A-204B472E8089}" type="pres">
       <dgm:prSet presAssocID="{DD85AA71-FCF2-4FDC-9422-7895B079CC34}" presName="Name64" presStyleLbl="parChTrans1D4" presStyleIdx="0" presStyleCnt="2"/>
       <dgm:spPr/>
+      <dgm:t>
+        <a:bodyPr/>
+        <a:lstStyle/>
+        <a:p>
+          <a:endParaRPr lang="en-US"/>
+        </a:p>
+      </dgm:t>
     </dgm:pt>
     <dgm:pt modelId="{8852DD16-F21F-4B31-B816-0B90F1A299E9}" type="pres">
       <dgm:prSet presAssocID="{33F83BBA-6DBF-4E33-BCA4-0E46414335A7}" presName="hierRoot2" presStyleCnt="0">
@@ -1956,6 +2014,13 @@
     <dgm:pt modelId="{62D68DB7-39FB-4261-B46F-7C10A5CEA719}" type="pres">
       <dgm:prSet presAssocID="{D83CB275-9918-4F74-BA64-4C5DF1E526AA}" presName="Name64" presStyleLbl="parChTrans1D3" presStyleIdx="2" presStyleCnt="5"/>
       <dgm:spPr/>
+      <dgm:t>
+        <a:bodyPr/>
+        <a:lstStyle/>
+        <a:p>
+          <a:endParaRPr lang="en-US"/>
+        </a:p>
+      </dgm:t>
     </dgm:pt>
     <dgm:pt modelId="{4EF0DA1D-5832-4ABA-9F0C-95C24C42E7AB}" type="pres">
       <dgm:prSet presAssocID="{FE1035C1-8066-4365-9512-BE8B68D0E412}" presName="hierRoot2" presStyleCnt="0">
@@ -1987,6 +2052,13 @@
     <dgm:pt modelId="{16AB8AEC-D425-4E8D-A483-DC34126D764E}" type="pres">
       <dgm:prSet presAssocID="{FE1035C1-8066-4365-9512-BE8B68D0E412}" presName="rootConnector" presStyleLbl="node3" presStyleIdx="2" presStyleCnt="5"/>
       <dgm:spPr/>
+      <dgm:t>
+        <a:bodyPr/>
+        <a:lstStyle/>
+        <a:p>
+          <a:endParaRPr lang="en-US"/>
+        </a:p>
+      </dgm:t>
     </dgm:pt>
     <dgm:pt modelId="{21EF4C9E-9014-41E1-8161-59D5F405A751}" type="pres">
       <dgm:prSet presAssocID="{FE1035C1-8066-4365-9512-BE8B68D0E412}" presName="hierChild4" presStyleCnt="0"/>
@@ -1995,6 +2067,13 @@
     <dgm:pt modelId="{F35D96D2-C944-4B24-941A-003A72999F1A}" type="pres">
       <dgm:prSet presAssocID="{B5F7F7EF-39D3-47E2-88D4-899E0316A87E}" presName="Name64" presStyleLbl="parChTrans1D4" presStyleIdx="1" presStyleCnt="2"/>
       <dgm:spPr/>
+      <dgm:t>
+        <a:bodyPr/>
+        <a:lstStyle/>
+        <a:p>
+          <a:endParaRPr lang="en-US"/>
+        </a:p>
+      </dgm:t>
     </dgm:pt>
     <dgm:pt modelId="{0067CB56-366C-41CF-AD31-B0A46734892B}" type="pres">
       <dgm:prSet presAssocID="{71C00A5A-663F-4EA6-B54B-8CC369209A4E}" presName="hierRoot2" presStyleCnt="0">
@@ -2053,6 +2132,13 @@
     <dgm:pt modelId="{F7B49448-3C76-4110-A28F-867864BC50E1}" type="pres">
       <dgm:prSet presAssocID="{CB9C2599-3E1D-4D07-9233-C1BD7206AF8E}" presName="Name64" presStyleLbl="parChTrans1D2" presStyleIdx="3" presStyleCnt="5"/>
       <dgm:spPr/>
+      <dgm:t>
+        <a:bodyPr/>
+        <a:lstStyle/>
+        <a:p>
+          <a:endParaRPr lang="en-US"/>
+        </a:p>
+      </dgm:t>
     </dgm:pt>
     <dgm:pt modelId="{7DF61252-7634-46AE-867C-7A1AE44CC486}" type="pres">
       <dgm:prSet presAssocID="{279B2582-EDB0-4F89-AAED-E1FBE3C07712}" presName="hierRoot2" presStyleCnt="0">
@@ -2073,10 +2159,24 @@
         </dgm:presLayoutVars>
       </dgm:prSet>
       <dgm:spPr/>
+      <dgm:t>
+        <a:bodyPr/>
+        <a:lstStyle/>
+        <a:p>
+          <a:endParaRPr lang="en-US"/>
+        </a:p>
+      </dgm:t>
     </dgm:pt>
     <dgm:pt modelId="{86AA25A3-D5AB-4704-98B2-832D294C4304}" type="pres">
       <dgm:prSet presAssocID="{279B2582-EDB0-4F89-AAED-E1FBE3C07712}" presName="rootConnector" presStyleLbl="node2" presStyleIdx="3" presStyleCnt="5"/>
       <dgm:spPr/>
+      <dgm:t>
+        <a:bodyPr/>
+        <a:lstStyle/>
+        <a:p>
+          <a:endParaRPr lang="en-US"/>
+        </a:p>
+      </dgm:t>
     </dgm:pt>
     <dgm:pt modelId="{CF218F76-9301-427C-93A0-A375EC76B890}" type="pres">
       <dgm:prSet presAssocID="{279B2582-EDB0-4F89-AAED-E1FBE3C07712}" presName="hierChild4" presStyleCnt="0"/>
@@ -2085,6 +2185,13 @@
     <dgm:pt modelId="{6EB11D7A-4053-47F0-B85C-1079C1C82F84}" type="pres">
       <dgm:prSet presAssocID="{1799D056-DCBF-443E-AAA6-B2DD430B0BDD}" presName="Name64" presStyleLbl="parChTrans1D3" presStyleIdx="3" presStyleCnt="5"/>
       <dgm:spPr/>
+      <dgm:t>
+        <a:bodyPr/>
+        <a:lstStyle/>
+        <a:p>
+          <a:endParaRPr lang="en-US"/>
+        </a:p>
+      </dgm:t>
     </dgm:pt>
     <dgm:pt modelId="{60515A18-FEF2-4147-9CD6-4BC898788A1D}" type="pres">
       <dgm:prSet presAssocID="{C32559E3-CF7C-4117-A99C-674AF753F4D1}" presName="hierRoot2" presStyleCnt="0">
@@ -2139,6 +2246,13 @@
     <dgm:pt modelId="{F1D780BC-182B-4860-B475-FFC9E597ED5C}" type="pres">
       <dgm:prSet presAssocID="{2B9A484B-7B4C-43C0-9DDF-AA004E2E384B}" presName="Name64" presStyleLbl="parChTrans1D2" presStyleIdx="4" presStyleCnt="5"/>
       <dgm:spPr/>
+      <dgm:t>
+        <a:bodyPr/>
+        <a:lstStyle/>
+        <a:p>
+          <a:endParaRPr lang="en-US"/>
+        </a:p>
+      </dgm:t>
     </dgm:pt>
     <dgm:pt modelId="{CB02D898-EFCE-4270-900E-501A27DC770B}" type="pres">
       <dgm:prSet presAssocID="{424325A6-59D5-4CE8-9355-8F5A43032829}" presName="hierRoot2" presStyleCnt="0">
@@ -2170,6 +2284,13 @@
     <dgm:pt modelId="{A39A6236-C020-41A7-B7C1-BF8F3579C7E6}" type="pres">
       <dgm:prSet presAssocID="{424325A6-59D5-4CE8-9355-8F5A43032829}" presName="rootConnector" presStyleLbl="node2" presStyleIdx="4" presStyleCnt="5"/>
       <dgm:spPr/>
+      <dgm:t>
+        <a:bodyPr/>
+        <a:lstStyle/>
+        <a:p>
+          <a:endParaRPr lang="en-US"/>
+        </a:p>
+      </dgm:t>
     </dgm:pt>
     <dgm:pt modelId="{7545F243-CEEB-4EDA-851E-DB6DC6CDAAB2}" type="pres">
       <dgm:prSet presAssocID="{424325A6-59D5-4CE8-9355-8F5A43032829}" presName="hierChild4" presStyleCnt="0"/>
@@ -2178,6 +2299,13 @@
     <dgm:pt modelId="{E7F8EF03-7D5C-44C2-903E-DB93F63094E6}" type="pres">
       <dgm:prSet presAssocID="{233343D9-556B-44D1-AFCE-0235922CB5E1}" presName="Name64" presStyleLbl="parChTrans1D3" presStyleIdx="4" presStyleCnt="5"/>
       <dgm:spPr/>
+      <dgm:t>
+        <a:bodyPr/>
+        <a:lstStyle/>
+        <a:p>
+          <a:endParaRPr lang="en-US"/>
+        </a:p>
+      </dgm:t>
     </dgm:pt>
     <dgm:pt modelId="{B4946324-E13F-4377-A54A-C4AB7E2B5FB6}" type="pres">
       <dgm:prSet presAssocID="{78ACB782-0103-4B65-A57C-25B1AF52D1E6}" presName="hierRoot2" presStyleCnt="0">
@@ -2235,61 +2363,61 @@
     </dgm:pt>
   </dgm:ptLst>
   <dgm:cxnLst>
-    <dgm:cxn modelId="{8C6C27EA-D973-4CEF-9CDB-76F7AF7FDD30}" type="presOf" srcId="{233343D9-556B-44D1-AFCE-0235922CB5E1}" destId="{E7F8EF03-7D5C-44C2-903E-DB93F63094E6}" srcOrd="0" destOrd="0" presId="urn:microsoft.com/office/officeart/2009/3/layout/HorizontalOrganizationChart"/>
-    <dgm:cxn modelId="{2F30FFD0-AD96-4AB0-885B-F5A36BA110EC}" type="presOf" srcId="{18098B98-3D02-4896-B26C-F45ACCBFA8F8}" destId="{8D37030A-DCE6-41F1-85A1-3118BB466C91}" srcOrd="0" destOrd="0" presId="urn:microsoft.com/office/officeart/2009/3/layout/HorizontalOrganizationChart"/>
-    <dgm:cxn modelId="{E63B9216-CF01-415B-AF4C-83F32D79606A}" type="presOf" srcId="{71C00A5A-663F-4EA6-B54B-8CC369209A4E}" destId="{A5AB7D35-D744-41C9-A266-8A72A8827A3D}" srcOrd="1" destOrd="0" presId="urn:microsoft.com/office/officeart/2009/3/layout/HorizontalOrganizationChart"/>
+    <dgm:cxn modelId="{9DD0F50D-FDBD-4594-B284-65398EE5D7B1}" srcId="{18098B98-3D02-4896-B26C-F45ACCBFA8F8}" destId="{9ACAFCFC-5142-4C6A-A550-74BE20AD0CD4}" srcOrd="1" destOrd="0" parTransId="{E0187B90-0B2D-46EB-8BC8-7BEDB02F6EA5}" sibTransId="{6F57A03F-5826-4993-A45E-1E750A0332B3}"/>
+    <dgm:cxn modelId="{FEA260DD-2BB0-482C-88CC-0BCF1B1BA4D6}" type="presOf" srcId="{A38FC05A-5E07-4CA3-AED3-120F80C38C9B}" destId="{B7763EA0-6D75-420B-B14A-87B95D9C65AD}" srcOrd="0" destOrd="0" presId="urn:microsoft.com/office/officeart/2009/3/layout/HorizontalOrganizationChart"/>
+    <dgm:cxn modelId="{5B074D8B-311F-4FC0-B6D7-2DEB27723333}" type="presOf" srcId="{72083E10-9578-428E-9526-4CA88DDE97A2}" destId="{FF1B0FC5-8795-428E-BAB2-51655DF9BFAC}" srcOrd="1" destOrd="0" presId="urn:microsoft.com/office/officeart/2009/3/layout/HorizontalOrganizationChart"/>
     <dgm:cxn modelId="{F5F884F8-B36B-485A-82D0-91F1FDA0E049}" type="presOf" srcId="{8AA9C7FB-F78D-4148-9370-C08F5FBBB4D8}" destId="{A4009376-3652-4230-A4A8-00177C029550}" srcOrd="0" destOrd="0" presId="urn:microsoft.com/office/officeart/2009/3/layout/HorizontalOrganizationChart"/>
     <dgm:cxn modelId="{B16E2F05-BC6C-488D-8746-8DFFA4A898CB}" type="presOf" srcId="{33F83BBA-6DBF-4E33-BCA4-0E46414335A7}" destId="{8820C003-E2F4-4095-BF9D-4CF22DB50F5F}" srcOrd="0" destOrd="0" presId="urn:microsoft.com/office/officeart/2009/3/layout/HorizontalOrganizationChart"/>
+    <dgm:cxn modelId="{6D6DA23B-D12E-4C30-968A-ABEC40671FCE}" type="presOf" srcId="{72083E10-9578-428E-9526-4CA88DDE97A2}" destId="{EDEA0F51-606C-486A-AD15-D1B2FD25F3D4}" srcOrd="0" destOrd="0" presId="urn:microsoft.com/office/officeart/2009/3/layout/HorizontalOrganizationChart"/>
+    <dgm:cxn modelId="{08A9BBD6-0902-4E85-A790-22029D8C0541}" type="presOf" srcId="{B790851C-B0C6-410E-A59E-486430AB8981}" destId="{28EDBAFB-A8C2-4256-824E-38FCE77CBDCE}" srcOrd="1" destOrd="0" presId="urn:microsoft.com/office/officeart/2009/3/layout/HorizontalOrganizationChart"/>
+    <dgm:cxn modelId="{B517EFC1-06FB-4505-96C6-5CC65825F744}" type="presOf" srcId="{FE1035C1-8066-4365-9512-BE8B68D0E412}" destId="{16AB8AEC-D425-4E8D-A483-DC34126D764E}" srcOrd="1" destOrd="0" presId="urn:microsoft.com/office/officeart/2009/3/layout/HorizontalOrganizationChart"/>
+    <dgm:cxn modelId="{70286D89-B8B0-42F2-9226-B9DC48A5D629}" type="presOf" srcId="{30DB14B4-C961-470D-9A47-EEC7F9368630}" destId="{C749CD90-5ED1-40E7-9C5B-D2F44FC6E4B6}" srcOrd="0" destOrd="0" presId="urn:microsoft.com/office/officeart/2009/3/layout/HorizontalOrganizationChart"/>
+    <dgm:cxn modelId="{E3AB5867-B97A-4069-85A1-C0F1EE5BB753}" type="presOf" srcId="{424325A6-59D5-4CE8-9355-8F5A43032829}" destId="{A39A6236-C020-41A7-B7C1-BF8F3579C7E6}" srcOrd="1" destOrd="0" presId="urn:microsoft.com/office/officeart/2009/3/layout/HorizontalOrganizationChart"/>
+    <dgm:cxn modelId="{645F06F8-E020-4374-93BE-CD8FC6210812}" type="presOf" srcId="{78ACB782-0103-4B65-A57C-25B1AF52D1E6}" destId="{BFD9586F-8834-4A5F-BEDA-0BA76CBBAB3D}" srcOrd="1" destOrd="0" presId="urn:microsoft.com/office/officeart/2009/3/layout/HorizontalOrganizationChart"/>
+    <dgm:cxn modelId="{65580E02-A5F7-4986-9DCD-6DED060EC8C2}" srcId="{279B2582-EDB0-4F89-AAED-E1FBE3C07712}" destId="{C32559E3-CF7C-4117-A99C-674AF753F4D1}" srcOrd="0" destOrd="0" parTransId="{1799D056-DCBF-443E-AAA6-B2DD430B0BDD}" sibTransId="{06A95573-5714-411A-BE47-AB8DBCB656A8}"/>
+    <dgm:cxn modelId="{F1E76E21-06D2-47D7-B60C-64EFF098C12B}" type="presOf" srcId="{B790851C-B0C6-410E-A59E-486430AB8981}" destId="{7EEAB5C6-0A9F-4337-9CAA-110E499E7EE3}" srcOrd="0" destOrd="0" presId="urn:microsoft.com/office/officeart/2009/3/layout/HorizontalOrganizationChart"/>
+    <dgm:cxn modelId="{2F30FFD0-AD96-4AB0-885B-F5A36BA110EC}" type="presOf" srcId="{18098B98-3D02-4896-B26C-F45ACCBFA8F8}" destId="{8D37030A-DCE6-41F1-85A1-3118BB466C91}" srcOrd="0" destOrd="0" presId="urn:microsoft.com/office/officeart/2009/3/layout/HorizontalOrganizationChart"/>
+    <dgm:cxn modelId="{5C88FA15-C6F2-4873-9F3C-97E18BFA8D8C}" type="presOf" srcId="{9ACAFCFC-5142-4C6A-A550-74BE20AD0CD4}" destId="{BE907398-AA16-4188-B20A-D96C29A10321}" srcOrd="0" destOrd="0" presId="urn:microsoft.com/office/officeart/2009/3/layout/HorizontalOrganizationChart"/>
+    <dgm:cxn modelId="{21BB1CC7-A5D7-4C01-9791-1B1EC7CA15BC}" type="presOf" srcId="{9820A920-A84E-482F-91C1-BD589D4D3874}" destId="{3543BE83-C603-4DAB-954F-410569B1B357}" srcOrd="1" destOrd="0" presId="urn:microsoft.com/office/officeart/2009/3/layout/HorizontalOrganizationChart"/>
+    <dgm:cxn modelId="{ECD1E5AA-4F59-4BBF-85C6-784FB44DB170}" type="presOf" srcId="{C32559E3-CF7C-4117-A99C-674AF753F4D1}" destId="{5EC98DE1-0754-47B2-A70A-76DC67919EF3}" srcOrd="0" destOrd="0" presId="urn:microsoft.com/office/officeart/2009/3/layout/HorizontalOrganizationChart"/>
+    <dgm:cxn modelId="{3E8C660A-F916-47D9-BCB6-FA6F51F7EF2B}" type="presOf" srcId="{CB9C2599-3E1D-4D07-9233-C1BD7206AF8E}" destId="{F7B49448-3C76-4110-A28F-867864BC50E1}" srcOrd="0" destOrd="0" presId="urn:microsoft.com/office/officeart/2009/3/layout/HorizontalOrganizationChart"/>
+    <dgm:cxn modelId="{B230A624-E857-4860-ACBD-9A3761F18451}" srcId="{9ACAFCFC-5142-4C6A-A550-74BE20AD0CD4}" destId="{B790851C-B0C6-410E-A59E-486430AB8981}" srcOrd="2" destOrd="0" parTransId="{7C9DDF55-A9A0-4323-B06E-427F82A2F6D2}" sibTransId="{4A718B0D-B963-4340-A930-86EA7C4EFEB2}"/>
+    <dgm:cxn modelId="{F26C6887-0E80-4E0C-9312-5A6545382380}" type="presOf" srcId="{C32559E3-CF7C-4117-A99C-674AF753F4D1}" destId="{E4F7F334-2F4B-469C-96E5-41538B52B854}" srcOrd="1" destOrd="0" presId="urn:microsoft.com/office/officeart/2009/3/layout/HorizontalOrganizationChart"/>
+    <dgm:cxn modelId="{3824EF86-AC98-4744-AA22-6FF353294ED3}" type="presOf" srcId="{6956A6E1-FFF9-46E7-8408-50A1E09DBB2A}" destId="{CE1FC5FA-9C23-4D24-9F34-C13162305A3A}" srcOrd="1" destOrd="0" presId="urn:microsoft.com/office/officeart/2009/3/layout/HorizontalOrganizationChart"/>
+    <dgm:cxn modelId="{950D4B02-09AD-4853-9D3D-303E02056494}" type="presOf" srcId="{9ACAFCFC-5142-4C6A-A550-74BE20AD0CD4}" destId="{CF2F7F3E-7E7D-4936-A1EC-318FAD052DCC}" srcOrd="1" destOrd="0" presId="urn:microsoft.com/office/officeart/2009/3/layout/HorizontalOrganizationChart"/>
+    <dgm:cxn modelId="{D64A9547-5415-48F2-967B-3DC76C97C060}" type="presOf" srcId="{71C00A5A-663F-4EA6-B54B-8CC369209A4E}" destId="{695F91BB-A5ED-4CA3-884B-3DAF4A0C8B33}" srcOrd="0" destOrd="0" presId="urn:microsoft.com/office/officeart/2009/3/layout/HorizontalOrganizationChart"/>
+    <dgm:cxn modelId="{CEF9DAA6-0845-4380-BD08-E36BF9214691}" type="presOf" srcId="{8F01386C-55D0-4009-A6FA-8DECC9103B43}" destId="{2D9563FE-565D-4961-B5B9-2BCE864EC2D6}" srcOrd="0" destOrd="0" presId="urn:microsoft.com/office/officeart/2009/3/layout/HorizontalOrganizationChart"/>
+    <dgm:cxn modelId="{BF9A558F-3383-4795-A004-4BFFC88BD2B9}" srcId="{18098B98-3D02-4896-B26C-F45ACCBFA8F8}" destId="{72083E10-9578-428E-9526-4CA88DDE97A2}" srcOrd="0" destOrd="0" parTransId="{00678664-7F8F-41B0-A8BA-C9303C5325FD}" sibTransId="{C1E857C0-6817-43FB-A4A3-2C90ED90707D}"/>
+    <dgm:cxn modelId="{30F4752E-A592-4F2F-8310-4901B81A52C3}" type="presOf" srcId="{33F83BBA-6DBF-4E33-BCA4-0E46414335A7}" destId="{B2EA2C21-7317-4650-B64F-4ACA1491CDC1}" srcOrd="1" destOrd="0" presId="urn:microsoft.com/office/officeart/2009/3/layout/HorizontalOrganizationChart"/>
+    <dgm:cxn modelId="{F03EB7DA-F153-4793-8B51-12215DFAF979}" type="presOf" srcId="{68C308F2-8621-4026-BFBD-AF4B69F59443}" destId="{7E2CC93C-EC34-4B42-9500-E51920FBD042}" srcOrd="0" destOrd="0" presId="urn:microsoft.com/office/officeart/2009/3/layout/HorizontalOrganizationChart"/>
+    <dgm:cxn modelId="{3A878F2A-0103-4978-8338-E6200E962AB5}" type="presOf" srcId="{6956A6E1-FFF9-46E7-8408-50A1E09DBB2A}" destId="{EE580C2E-9359-4716-A7E9-816AF8AA2468}" srcOrd="0" destOrd="0" presId="urn:microsoft.com/office/officeart/2009/3/layout/HorizontalOrganizationChart"/>
+    <dgm:cxn modelId="{3522AE86-F6BA-4678-9215-C220D6EF444E}" type="presOf" srcId="{DD85AA71-FCF2-4FDC-9422-7895B079CC34}" destId="{70C69F3D-6797-463F-932A-204B472E8089}" srcOrd="0" destOrd="0" presId="urn:microsoft.com/office/officeart/2009/3/layout/HorizontalOrganizationChart"/>
+    <dgm:cxn modelId="{4FE5C0A1-96D3-4820-993F-D0614CF81FE4}" type="presOf" srcId="{1799D056-DCBF-443E-AAA6-B2DD430B0BDD}" destId="{6EB11D7A-4053-47F0-B85C-1079C1C82F84}" srcOrd="0" destOrd="0" presId="urn:microsoft.com/office/officeart/2009/3/layout/HorizontalOrganizationChart"/>
+    <dgm:cxn modelId="{F13552B7-1AFE-4E20-B44D-AA9F2A08C10A}" type="presOf" srcId="{B5F7F7EF-39D3-47E2-88D4-899E0316A87E}" destId="{F35D96D2-C944-4B24-941A-003A72999F1A}" srcOrd="0" destOrd="0" presId="urn:microsoft.com/office/officeart/2009/3/layout/HorizontalOrganizationChart"/>
+    <dgm:cxn modelId="{9CEDB3CA-DF6E-42F2-949A-FC75F11F1F51}" type="presOf" srcId="{A38FC05A-5E07-4CA3-AED3-120F80C38C9B}" destId="{B2997602-79B5-4384-AE80-96DC36476E35}" srcOrd="1" destOrd="0" presId="urn:microsoft.com/office/officeart/2009/3/layout/HorizontalOrganizationChart"/>
+    <dgm:cxn modelId="{2DA9D409-1A77-4DFE-AD85-6ED081CFC46C}" type="presOf" srcId="{424325A6-59D5-4CE8-9355-8F5A43032829}" destId="{06AA0649-735C-4A67-9AD7-479DD49DC653}" srcOrd="0" destOrd="0" presId="urn:microsoft.com/office/officeart/2009/3/layout/HorizontalOrganizationChart"/>
+    <dgm:cxn modelId="{8C6C27EA-D973-4CEF-9CDB-76F7AF7FDD30}" type="presOf" srcId="{233343D9-556B-44D1-AFCE-0235922CB5E1}" destId="{E7F8EF03-7D5C-44C2-903E-DB93F63094E6}" srcOrd="0" destOrd="0" presId="urn:microsoft.com/office/officeart/2009/3/layout/HorizontalOrganizationChart"/>
+    <dgm:cxn modelId="{A3D6C576-441B-49A2-9C65-50DCB2C3BD43}" srcId="{9ACAFCFC-5142-4C6A-A550-74BE20AD0CD4}" destId="{424325A6-59D5-4CE8-9355-8F5A43032829}" srcOrd="4" destOrd="0" parTransId="{2B9A484B-7B4C-43C0-9DDF-AA004E2E384B}" sibTransId="{AD5673D2-48FB-41D7-B9C0-1724EF1AA1CD}"/>
+    <dgm:cxn modelId="{4B782F2C-A2CF-4655-9635-7EAAD8B9AB0A}" srcId="{B790851C-B0C6-410E-A59E-486430AB8981}" destId="{FE1035C1-8066-4365-9512-BE8B68D0E412}" srcOrd="1" destOrd="0" parTransId="{D83CB275-9918-4F74-BA64-4C5DF1E526AA}" sibTransId="{530E89C7-3017-4697-B4E4-BFE6082BE71C}"/>
+    <dgm:cxn modelId="{6FE65171-F30B-4513-A97A-5A00CF24A815}" srcId="{DE7AFE1B-E420-469B-A239-2BC7B687EB5A}" destId="{33F83BBA-6DBF-4E33-BCA4-0E46414335A7}" srcOrd="0" destOrd="0" parTransId="{DD85AA71-FCF2-4FDC-9422-7895B079CC34}" sibTransId="{EE0BFE5F-066B-4D65-9A5F-EB2975C0063F}"/>
+    <dgm:cxn modelId="{4D01D3A8-8CA3-4384-B4F2-8ECB7A8B17E8}" type="presOf" srcId="{FE1035C1-8066-4365-9512-BE8B68D0E412}" destId="{7936CCD5-7190-42E1-AD14-3A64D7AFB5D9}" srcOrd="0" destOrd="0" presId="urn:microsoft.com/office/officeart/2009/3/layout/HorizontalOrganizationChart"/>
+    <dgm:cxn modelId="{51B9F2E6-954E-47F2-8332-21AAA579C48D}" srcId="{9ACAFCFC-5142-4C6A-A550-74BE20AD0CD4}" destId="{279B2582-EDB0-4F89-AAED-E1FBE3C07712}" srcOrd="3" destOrd="0" parTransId="{CB9C2599-3E1D-4D07-9233-C1BD7206AF8E}" sibTransId="{3A5077FD-F169-48AE-96DF-4903B7E62A74}"/>
     <dgm:cxn modelId="{937E1A1F-5C8B-45D2-A703-D58636573A26}" srcId="{B790851C-B0C6-410E-A59E-486430AB8981}" destId="{DE7AFE1B-E420-469B-A239-2BC7B687EB5A}" srcOrd="0" destOrd="0" parTransId="{68C308F2-8621-4026-BFBD-AF4B69F59443}" sibTransId="{713BD179-EC15-498F-BE4F-948D97B392A0}"/>
+    <dgm:cxn modelId="{B3036E75-110A-4197-B369-0F380A4765CC}" srcId="{9ACAFCFC-5142-4C6A-A550-74BE20AD0CD4}" destId="{A38FC05A-5E07-4CA3-AED3-120F80C38C9B}" srcOrd="0" destOrd="0" parTransId="{30DB14B4-C961-470D-9A47-EEC7F9368630}" sibTransId="{659ABC5A-C67B-4053-9512-4BDAFEC2B7D9}"/>
+    <dgm:cxn modelId="{33D1C6FF-5B82-4C92-9EAB-AE79287208D2}" type="presOf" srcId="{2B9A484B-7B4C-43C0-9DDF-AA004E2E384B}" destId="{F1D780BC-182B-4860-B475-FFC9E597ED5C}" srcOrd="0" destOrd="0" presId="urn:microsoft.com/office/officeart/2009/3/layout/HorizontalOrganizationChart"/>
+    <dgm:cxn modelId="{EC8CF86F-ED82-446C-8625-08ACB631F0C3}" srcId="{9ACAFCFC-5142-4C6A-A550-74BE20AD0CD4}" destId="{9820A920-A84E-482F-91C1-BD589D4D3874}" srcOrd="1" destOrd="0" parTransId="{8F01386C-55D0-4009-A6FA-8DECC9103B43}" sibTransId="{185776B9-EA26-47D1-94B7-BC66FA543F93}"/>
+    <dgm:cxn modelId="{E467DD5A-126E-4CF4-8243-5CBDE1002A12}" srcId="{9820A920-A84E-482F-91C1-BD589D4D3874}" destId="{6956A6E1-FFF9-46E7-8408-50A1E09DBB2A}" srcOrd="0" destOrd="0" parTransId="{8AA9C7FB-F78D-4148-9370-C08F5FBBB4D8}" sibTransId="{4C1FF462-28AB-4AFF-BE18-AFE3BCAA3360}"/>
+    <dgm:cxn modelId="{523F472C-9AEE-4967-B648-55283836B9B2}" type="presOf" srcId="{78ACB782-0103-4B65-A57C-25B1AF52D1E6}" destId="{D2054CFD-64C3-4A75-80DB-0659435BF4B8}" srcOrd="0" destOrd="0" presId="urn:microsoft.com/office/officeart/2009/3/layout/HorizontalOrganizationChart"/>
+    <dgm:cxn modelId="{5BE14F77-A9CC-4B9B-B4E3-89B2D5B48676}" type="presOf" srcId="{9820A920-A84E-482F-91C1-BD589D4D3874}" destId="{9F994C9A-2375-4107-B9F6-FDFB87F7016B}" srcOrd="0" destOrd="0" presId="urn:microsoft.com/office/officeart/2009/3/layout/HorizontalOrganizationChart"/>
+    <dgm:cxn modelId="{1A0DE3BC-55E4-4D3C-B5D3-7A2AF18157B3}" srcId="{424325A6-59D5-4CE8-9355-8F5A43032829}" destId="{78ACB782-0103-4B65-A57C-25B1AF52D1E6}" srcOrd="0" destOrd="0" parTransId="{233343D9-556B-44D1-AFCE-0235922CB5E1}" sibTransId="{41FF7E36-0DF5-4B1E-8E61-381FFD6C6AAE}"/>
+    <dgm:cxn modelId="{E63B9216-CF01-415B-AF4C-83F32D79606A}" type="presOf" srcId="{71C00A5A-663F-4EA6-B54B-8CC369209A4E}" destId="{A5AB7D35-D744-41C9-A266-8A72A8827A3D}" srcOrd="1" destOrd="0" presId="urn:microsoft.com/office/officeart/2009/3/layout/HorizontalOrganizationChart"/>
     <dgm:cxn modelId="{39E21D3B-78ED-4868-B3FF-8ABC78E5B79D}" type="presOf" srcId="{DE7AFE1B-E420-469B-A239-2BC7B687EB5A}" destId="{AD1AC13B-AA59-4218-9B7F-29EE712C9900}" srcOrd="0" destOrd="0" presId="urn:microsoft.com/office/officeart/2009/3/layout/HorizontalOrganizationChart"/>
-    <dgm:cxn modelId="{5BE14F77-A9CC-4B9B-B4E3-89B2D5B48676}" type="presOf" srcId="{9820A920-A84E-482F-91C1-BD589D4D3874}" destId="{9F994C9A-2375-4107-B9F6-FDFB87F7016B}" srcOrd="0" destOrd="0" presId="urn:microsoft.com/office/officeart/2009/3/layout/HorizontalOrganizationChart"/>
-    <dgm:cxn modelId="{F13552B7-1AFE-4E20-B44D-AA9F2A08C10A}" type="presOf" srcId="{B5F7F7EF-39D3-47E2-88D4-899E0316A87E}" destId="{F35D96D2-C944-4B24-941A-003A72999F1A}" srcOrd="0" destOrd="0" presId="urn:microsoft.com/office/officeart/2009/3/layout/HorizontalOrganizationChart"/>
+    <dgm:cxn modelId="{C0D864E1-2320-4392-8284-C9E9235CDA6A}" type="presOf" srcId="{279B2582-EDB0-4F89-AAED-E1FBE3C07712}" destId="{CCFD2134-72E1-4F3E-A7E0-33AE67BF3C57}" srcOrd="0" destOrd="0" presId="urn:microsoft.com/office/officeart/2009/3/layout/HorizontalOrganizationChart"/>
+    <dgm:cxn modelId="{B5D5B470-7510-4AAB-A9D0-CE00371B5C5C}" type="presOf" srcId="{D83CB275-9918-4F74-BA64-4C5DF1E526AA}" destId="{62D68DB7-39FB-4261-B46F-7C10A5CEA719}" srcOrd="0" destOrd="0" presId="urn:microsoft.com/office/officeart/2009/3/layout/HorizontalOrganizationChart"/>
+    <dgm:cxn modelId="{8970C86A-AC71-4A0E-A394-4A37371D7228}" srcId="{FE1035C1-8066-4365-9512-BE8B68D0E412}" destId="{71C00A5A-663F-4EA6-B54B-8CC369209A4E}" srcOrd="0" destOrd="0" parTransId="{B5F7F7EF-39D3-47E2-88D4-899E0316A87E}" sibTransId="{9D176B20-F544-40D9-9232-C3F288522EF9}"/>
+    <dgm:cxn modelId="{0C828123-40FD-419E-90DA-118C31311498}" type="presOf" srcId="{DE7AFE1B-E420-469B-A239-2BC7B687EB5A}" destId="{08BB4427-5B1C-46AD-B6DA-939C7A309B74}" srcOrd="1" destOrd="0" presId="urn:microsoft.com/office/officeart/2009/3/layout/HorizontalOrganizationChart"/>
     <dgm:cxn modelId="{EBF0A67F-31BF-42FC-BCF2-E9FC77470CC9}" type="presOf" srcId="{7C9DDF55-A9A0-4323-B06E-427F82A2F6D2}" destId="{7DB32FB0-B1FE-479C-ABAD-9BFF92FD762B}" srcOrd="0" destOrd="0" presId="urn:microsoft.com/office/officeart/2009/3/layout/HorizontalOrganizationChart"/>
-    <dgm:cxn modelId="{ECD1E5AA-4F59-4BBF-85C6-784FB44DB170}" type="presOf" srcId="{C32559E3-CF7C-4117-A99C-674AF753F4D1}" destId="{5EC98DE1-0754-47B2-A70A-76DC67919EF3}" srcOrd="0" destOrd="0" presId="urn:microsoft.com/office/officeart/2009/3/layout/HorizontalOrganizationChart"/>
-    <dgm:cxn modelId="{3522AE86-F6BA-4678-9215-C220D6EF444E}" type="presOf" srcId="{DD85AA71-FCF2-4FDC-9422-7895B079CC34}" destId="{70C69F3D-6797-463F-932A-204B472E8089}" srcOrd="0" destOrd="0" presId="urn:microsoft.com/office/officeart/2009/3/layout/HorizontalOrganizationChart"/>
-    <dgm:cxn modelId="{4B782F2C-A2CF-4655-9635-7EAAD8B9AB0A}" srcId="{B790851C-B0C6-410E-A59E-486430AB8981}" destId="{FE1035C1-8066-4365-9512-BE8B68D0E412}" srcOrd="1" destOrd="0" parTransId="{D83CB275-9918-4F74-BA64-4C5DF1E526AA}" sibTransId="{530E89C7-3017-4697-B4E4-BFE6082BE71C}"/>
-    <dgm:cxn modelId="{E3AB5867-B97A-4069-85A1-C0F1EE5BB753}" type="presOf" srcId="{424325A6-59D5-4CE8-9355-8F5A43032829}" destId="{A39A6236-C020-41A7-B7C1-BF8F3579C7E6}" srcOrd="1" destOrd="0" presId="urn:microsoft.com/office/officeart/2009/3/layout/HorizontalOrganizationChart"/>
-    <dgm:cxn modelId="{BF9A558F-3383-4795-A004-4BFFC88BD2B9}" srcId="{18098B98-3D02-4896-B26C-F45ACCBFA8F8}" destId="{72083E10-9578-428E-9526-4CA88DDE97A2}" srcOrd="0" destOrd="0" parTransId="{00678664-7F8F-41B0-A8BA-C9303C5325FD}" sibTransId="{C1E857C0-6817-43FB-A4A3-2C90ED90707D}"/>
-    <dgm:cxn modelId="{F26C6887-0E80-4E0C-9312-5A6545382380}" type="presOf" srcId="{C32559E3-CF7C-4117-A99C-674AF753F4D1}" destId="{E4F7F334-2F4B-469C-96E5-41538B52B854}" srcOrd="1" destOrd="0" presId="urn:microsoft.com/office/officeart/2009/3/layout/HorizontalOrganizationChart"/>
-    <dgm:cxn modelId="{4FE5C0A1-96D3-4820-993F-D0614CF81FE4}" type="presOf" srcId="{1799D056-DCBF-443E-AAA6-B2DD430B0BDD}" destId="{6EB11D7A-4053-47F0-B85C-1079C1C82F84}" srcOrd="0" destOrd="0" presId="urn:microsoft.com/office/officeart/2009/3/layout/HorizontalOrganizationChart"/>
-    <dgm:cxn modelId="{21BB1CC7-A5D7-4C01-9791-1B1EC7CA15BC}" type="presOf" srcId="{9820A920-A84E-482F-91C1-BD589D4D3874}" destId="{3543BE83-C603-4DAB-954F-410569B1B357}" srcOrd="1" destOrd="0" presId="urn:microsoft.com/office/officeart/2009/3/layout/HorizontalOrganizationChart"/>
-    <dgm:cxn modelId="{F03EB7DA-F153-4793-8B51-12215DFAF979}" type="presOf" srcId="{68C308F2-8621-4026-BFBD-AF4B69F59443}" destId="{7E2CC93C-EC34-4B42-9500-E51920FBD042}" srcOrd="0" destOrd="0" presId="urn:microsoft.com/office/officeart/2009/3/layout/HorizontalOrganizationChart"/>
-    <dgm:cxn modelId="{645F06F8-E020-4374-93BE-CD8FC6210812}" type="presOf" srcId="{78ACB782-0103-4B65-A57C-25B1AF52D1E6}" destId="{BFD9586F-8834-4A5F-BEDA-0BA76CBBAB3D}" srcOrd="1" destOrd="0" presId="urn:microsoft.com/office/officeart/2009/3/layout/HorizontalOrganizationChart"/>
-    <dgm:cxn modelId="{2DA9D409-1A77-4DFE-AD85-6ED081CFC46C}" type="presOf" srcId="{424325A6-59D5-4CE8-9355-8F5A43032829}" destId="{06AA0649-735C-4A67-9AD7-479DD49DC653}" srcOrd="0" destOrd="0" presId="urn:microsoft.com/office/officeart/2009/3/layout/HorizontalOrganizationChart"/>
     <dgm:cxn modelId="{A70DD653-71DC-4BDD-99A1-1CF972D8D3CF}" type="presOf" srcId="{279B2582-EDB0-4F89-AAED-E1FBE3C07712}" destId="{86AA25A3-D5AB-4704-98B2-832D294C4304}" srcOrd="1" destOrd="0" presId="urn:microsoft.com/office/officeart/2009/3/layout/HorizontalOrganizationChart"/>
-    <dgm:cxn modelId="{9DD0F50D-FDBD-4594-B284-65398EE5D7B1}" srcId="{18098B98-3D02-4896-B26C-F45ACCBFA8F8}" destId="{9ACAFCFC-5142-4C6A-A550-74BE20AD0CD4}" srcOrd="1" destOrd="0" parTransId="{E0187B90-0B2D-46EB-8BC8-7BEDB02F6EA5}" sibTransId="{6F57A03F-5826-4993-A45E-1E750A0332B3}"/>
-    <dgm:cxn modelId="{70286D89-B8B0-42F2-9226-B9DC48A5D629}" type="presOf" srcId="{30DB14B4-C961-470D-9A47-EEC7F9368630}" destId="{C749CD90-5ED1-40E7-9C5B-D2F44FC6E4B6}" srcOrd="0" destOrd="0" presId="urn:microsoft.com/office/officeart/2009/3/layout/HorizontalOrganizationChart"/>
-    <dgm:cxn modelId="{B517EFC1-06FB-4505-96C6-5CC65825F744}" type="presOf" srcId="{FE1035C1-8066-4365-9512-BE8B68D0E412}" destId="{16AB8AEC-D425-4E8D-A483-DC34126D764E}" srcOrd="1" destOrd="0" presId="urn:microsoft.com/office/officeart/2009/3/layout/HorizontalOrganizationChart"/>
-    <dgm:cxn modelId="{B230A624-E857-4860-ACBD-9A3761F18451}" srcId="{9ACAFCFC-5142-4C6A-A550-74BE20AD0CD4}" destId="{B790851C-B0C6-410E-A59E-486430AB8981}" srcOrd="2" destOrd="0" parTransId="{7C9DDF55-A9A0-4323-B06E-427F82A2F6D2}" sibTransId="{4A718B0D-B963-4340-A930-86EA7C4EFEB2}"/>
-    <dgm:cxn modelId="{3E8C660A-F916-47D9-BCB6-FA6F51F7EF2B}" type="presOf" srcId="{CB9C2599-3E1D-4D07-9233-C1BD7206AF8E}" destId="{F7B49448-3C76-4110-A28F-867864BC50E1}" srcOrd="0" destOrd="0" presId="urn:microsoft.com/office/officeart/2009/3/layout/HorizontalOrganizationChart"/>
-    <dgm:cxn modelId="{523F472C-9AEE-4967-B648-55283836B9B2}" type="presOf" srcId="{78ACB782-0103-4B65-A57C-25B1AF52D1E6}" destId="{D2054CFD-64C3-4A75-80DB-0659435BF4B8}" srcOrd="0" destOrd="0" presId="urn:microsoft.com/office/officeart/2009/3/layout/HorizontalOrganizationChart"/>
-    <dgm:cxn modelId="{A3D6C576-441B-49A2-9C65-50DCB2C3BD43}" srcId="{9ACAFCFC-5142-4C6A-A550-74BE20AD0CD4}" destId="{424325A6-59D5-4CE8-9355-8F5A43032829}" srcOrd="4" destOrd="0" parTransId="{2B9A484B-7B4C-43C0-9DDF-AA004E2E384B}" sibTransId="{AD5673D2-48FB-41D7-B9C0-1724EF1AA1CD}"/>
-    <dgm:cxn modelId="{8970C86A-AC71-4A0E-A394-4A37371D7228}" srcId="{FE1035C1-8066-4365-9512-BE8B68D0E412}" destId="{71C00A5A-663F-4EA6-B54B-8CC369209A4E}" srcOrd="0" destOrd="0" parTransId="{B5F7F7EF-39D3-47E2-88D4-899E0316A87E}" sibTransId="{9D176B20-F544-40D9-9232-C3F288522EF9}"/>
-    <dgm:cxn modelId="{4D01D3A8-8CA3-4384-B4F2-8ECB7A8B17E8}" type="presOf" srcId="{FE1035C1-8066-4365-9512-BE8B68D0E412}" destId="{7936CCD5-7190-42E1-AD14-3A64D7AFB5D9}" srcOrd="0" destOrd="0" presId="urn:microsoft.com/office/officeart/2009/3/layout/HorizontalOrganizationChart"/>
-    <dgm:cxn modelId="{CEF9DAA6-0845-4380-BD08-E36BF9214691}" type="presOf" srcId="{8F01386C-55D0-4009-A6FA-8DECC9103B43}" destId="{2D9563FE-565D-4961-B5B9-2BCE864EC2D6}" srcOrd="0" destOrd="0" presId="urn:microsoft.com/office/officeart/2009/3/layout/HorizontalOrganizationChart"/>
-    <dgm:cxn modelId="{5B074D8B-311F-4FC0-B6D7-2DEB27723333}" type="presOf" srcId="{72083E10-9578-428E-9526-4CA88DDE97A2}" destId="{FF1B0FC5-8795-428E-BAB2-51655DF9BFAC}" srcOrd="1" destOrd="0" presId="urn:microsoft.com/office/officeart/2009/3/layout/HorizontalOrganizationChart"/>
-    <dgm:cxn modelId="{65580E02-A5F7-4986-9DCD-6DED060EC8C2}" srcId="{279B2582-EDB0-4F89-AAED-E1FBE3C07712}" destId="{C32559E3-CF7C-4117-A99C-674AF753F4D1}" srcOrd="0" destOrd="0" parTransId="{1799D056-DCBF-443E-AAA6-B2DD430B0BDD}" sibTransId="{06A95573-5714-411A-BE47-AB8DBCB656A8}"/>
-    <dgm:cxn modelId="{9CEDB3CA-DF6E-42F2-949A-FC75F11F1F51}" type="presOf" srcId="{A38FC05A-5E07-4CA3-AED3-120F80C38C9B}" destId="{B2997602-79B5-4384-AE80-96DC36476E35}" srcOrd="1" destOrd="0" presId="urn:microsoft.com/office/officeart/2009/3/layout/HorizontalOrganizationChart"/>
-    <dgm:cxn modelId="{950D4B02-09AD-4853-9D3D-303E02056494}" type="presOf" srcId="{9ACAFCFC-5142-4C6A-A550-74BE20AD0CD4}" destId="{CF2F7F3E-7E7D-4936-A1EC-318FAD052DCC}" srcOrd="1" destOrd="0" presId="urn:microsoft.com/office/officeart/2009/3/layout/HorizontalOrganizationChart"/>
-    <dgm:cxn modelId="{33D1C6FF-5B82-4C92-9EAB-AE79287208D2}" type="presOf" srcId="{2B9A484B-7B4C-43C0-9DDF-AA004E2E384B}" destId="{F1D780BC-182B-4860-B475-FFC9E597ED5C}" srcOrd="0" destOrd="0" presId="urn:microsoft.com/office/officeart/2009/3/layout/HorizontalOrganizationChart"/>
-    <dgm:cxn modelId="{F1E76E21-06D2-47D7-B60C-64EFF098C12B}" type="presOf" srcId="{B790851C-B0C6-410E-A59E-486430AB8981}" destId="{7EEAB5C6-0A9F-4337-9CAA-110E499E7EE3}" srcOrd="0" destOrd="0" presId="urn:microsoft.com/office/officeart/2009/3/layout/HorizontalOrganizationChart"/>
-    <dgm:cxn modelId="{30F4752E-A592-4F2F-8310-4901B81A52C3}" type="presOf" srcId="{33F83BBA-6DBF-4E33-BCA4-0E46414335A7}" destId="{B2EA2C21-7317-4650-B64F-4ACA1491CDC1}" srcOrd="1" destOrd="0" presId="urn:microsoft.com/office/officeart/2009/3/layout/HorizontalOrganizationChart"/>
-    <dgm:cxn modelId="{1A0DE3BC-55E4-4D3C-B5D3-7A2AF18157B3}" srcId="{424325A6-59D5-4CE8-9355-8F5A43032829}" destId="{78ACB782-0103-4B65-A57C-25B1AF52D1E6}" srcOrd="0" destOrd="0" parTransId="{233343D9-556B-44D1-AFCE-0235922CB5E1}" sibTransId="{41FF7E36-0DF5-4B1E-8E61-381FFD6C6AAE}"/>
-    <dgm:cxn modelId="{FEA260DD-2BB0-482C-88CC-0BCF1B1BA4D6}" type="presOf" srcId="{A38FC05A-5E07-4CA3-AED3-120F80C38C9B}" destId="{B7763EA0-6D75-420B-B14A-87B95D9C65AD}" srcOrd="0" destOrd="0" presId="urn:microsoft.com/office/officeart/2009/3/layout/HorizontalOrganizationChart"/>
-    <dgm:cxn modelId="{0C828123-40FD-419E-90DA-118C31311498}" type="presOf" srcId="{DE7AFE1B-E420-469B-A239-2BC7B687EB5A}" destId="{08BB4427-5B1C-46AD-B6DA-939C7A309B74}" srcOrd="1" destOrd="0" presId="urn:microsoft.com/office/officeart/2009/3/layout/HorizontalOrganizationChart"/>
-    <dgm:cxn modelId="{08A9BBD6-0902-4E85-A790-22029D8C0541}" type="presOf" srcId="{B790851C-B0C6-410E-A59E-486430AB8981}" destId="{28EDBAFB-A8C2-4256-824E-38FCE77CBDCE}" srcOrd="1" destOrd="0" presId="urn:microsoft.com/office/officeart/2009/3/layout/HorizontalOrganizationChart"/>
-    <dgm:cxn modelId="{C0D864E1-2320-4392-8284-C9E9235CDA6A}" type="presOf" srcId="{279B2582-EDB0-4F89-AAED-E1FBE3C07712}" destId="{CCFD2134-72E1-4F3E-A7E0-33AE67BF3C57}" srcOrd="0" destOrd="0" presId="urn:microsoft.com/office/officeart/2009/3/layout/HorizontalOrganizationChart"/>
-    <dgm:cxn modelId="{51B9F2E6-954E-47F2-8332-21AAA579C48D}" srcId="{9ACAFCFC-5142-4C6A-A550-74BE20AD0CD4}" destId="{279B2582-EDB0-4F89-AAED-E1FBE3C07712}" srcOrd="3" destOrd="0" parTransId="{CB9C2599-3E1D-4D07-9233-C1BD7206AF8E}" sibTransId="{3A5077FD-F169-48AE-96DF-4903B7E62A74}"/>
-    <dgm:cxn modelId="{EC8CF86F-ED82-446C-8625-08ACB631F0C3}" srcId="{9ACAFCFC-5142-4C6A-A550-74BE20AD0CD4}" destId="{9820A920-A84E-482F-91C1-BD589D4D3874}" srcOrd="1" destOrd="0" parTransId="{8F01386C-55D0-4009-A6FA-8DECC9103B43}" sibTransId="{185776B9-EA26-47D1-94B7-BC66FA543F93}"/>
-    <dgm:cxn modelId="{5C88FA15-C6F2-4873-9F3C-97E18BFA8D8C}" type="presOf" srcId="{9ACAFCFC-5142-4C6A-A550-74BE20AD0CD4}" destId="{BE907398-AA16-4188-B20A-D96C29A10321}" srcOrd="0" destOrd="0" presId="urn:microsoft.com/office/officeart/2009/3/layout/HorizontalOrganizationChart"/>
-    <dgm:cxn modelId="{E467DD5A-126E-4CF4-8243-5CBDE1002A12}" srcId="{9820A920-A84E-482F-91C1-BD589D4D3874}" destId="{6956A6E1-FFF9-46E7-8408-50A1E09DBB2A}" srcOrd="0" destOrd="0" parTransId="{8AA9C7FB-F78D-4148-9370-C08F5FBBB4D8}" sibTransId="{4C1FF462-28AB-4AFF-BE18-AFE3BCAA3360}"/>
-    <dgm:cxn modelId="{3A878F2A-0103-4978-8338-E6200E962AB5}" type="presOf" srcId="{6956A6E1-FFF9-46E7-8408-50A1E09DBB2A}" destId="{EE580C2E-9359-4716-A7E9-816AF8AA2468}" srcOrd="0" destOrd="0" presId="urn:microsoft.com/office/officeart/2009/3/layout/HorizontalOrganizationChart"/>
-    <dgm:cxn modelId="{B3036E75-110A-4197-B369-0F380A4765CC}" srcId="{9ACAFCFC-5142-4C6A-A550-74BE20AD0CD4}" destId="{A38FC05A-5E07-4CA3-AED3-120F80C38C9B}" srcOrd="0" destOrd="0" parTransId="{30DB14B4-C961-470D-9A47-EEC7F9368630}" sibTransId="{659ABC5A-C67B-4053-9512-4BDAFEC2B7D9}"/>
-    <dgm:cxn modelId="{D64A9547-5415-48F2-967B-3DC76C97C060}" type="presOf" srcId="{71C00A5A-663F-4EA6-B54B-8CC369209A4E}" destId="{695F91BB-A5ED-4CA3-884B-3DAF4A0C8B33}" srcOrd="0" destOrd="0" presId="urn:microsoft.com/office/officeart/2009/3/layout/HorizontalOrganizationChart"/>
-    <dgm:cxn modelId="{3824EF86-AC98-4744-AA22-6FF353294ED3}" type="presOf" srcId="{6956A6E1-FFF9-46E7-8408-50A1E09DBB2A}" destId="{CE1FC5FA-9C23-4D24-9F34-C13162305A3A}" srcOrd="1" destOrd="0" presId="urn:microsoft.com/office/officeart/2009/3/layout/HorizontalOrganizationChart"/>
-    <dgm:cxn modelId="{B5D5B470-7510-4AAB-A9D0-CE00371B5C5C}" type="presOf" srcId="{D83CB275-9918-4F74-BA64-4C5DF1E526AA}" destId="{62D68DB7-39FB-4261-B46F-7C10A5CEA719}" srcOrd="0" destOrd="0" presId="urn:microsoft.com/office/officeart/2009/3/layout/HorizontalOrganizationChart"/>
-    <dgm:cxn modelId="{6FE65171-F30B-4513-A97A-5A00CF24A815}" srcId="{DE7AFE1B-E420-469B-A239-2BC7B687EB5A}" destId="{33F83BBA-6DBF-4E33-BCA4-0E46414335A7}" srcOrd="0" destOrd="0" parTransId="{DD85AA71-FCF2-4FDC-9422-7895B079CC34}" sibTransId="{EE0BFE5F-066B-4D65-9A5F-EB2975C0063F}"/>
-    <dgm:cxn modelId="{6D6DA23B-D12E-4C30-968A-ABEC40671FCE}" type="presOf" srcId="{72083E10-9578-428E-9526-4CA88DDE97A2}" destId="{EDEA0F51-606C-486A-AD15-D1B2FD25F3D4}" srcOrd="0" destOrd="0" presId="urn:microsoft.com/office/officeart/2009/3/layout/HorizontalOrganizationChart"/>
     <dgm:cxn modelId="{DF1FE531-7B35-446A-A2DD-8281BD2F0BE4}" type="presParOf" srcId="{8D37030A-DCE6-41F1-85A1-3118BB466C91}" destId="{D4A58A86-3A97-467D-974C-B5AD8E6B2DE5}" srcOrd="0" destOrd="0" presId="urn:microsoft.com/office/officeart/2009/3/layout/HorizontalOrganizationChart"/>
     <dgm:cxn modelId="{1957769C-88F1-4F55-963E-E9E9B2DC682A}" type="presParOf" srcId="{D4A58A86-3A97-467D-974C-B5AD8E6B2DE5}" destId="{EF3148DB-7DFB-4610-9FBC-FE1EFD64632D}" srcOrd="0" destOrd="0" presId="urn:microsoft.com/office/officeart/2009/3/layout/HorizontalOrganizationChart"/>
     <dgm:cxn modelId="{8C9CFEF6-FFF9-479F-84F1-2E89C69068B3}" type="presParOf" srcId="{EF3148DB-7DFB-4610-9FBC-FE1EFD64632D}" destId="{EDEA0F51-606C-486A-AD15-D1B2FD25F3D4}" srcOrd="0" destOrd="0" presId="urn:microsoft.com/office/officeart/2009/3/layout/HorizontalOrganizationChart"/>
@@ -3575,7 +3703,25 @@
             <a:rPr lang="en-US" sz="1400" b="1" kern="1200" dirty="0" err="1" smtClean="0"/>
             <a:t>NestVisitOverlap</a:t>
           </a:r>
-          <a:endParaRPr lang="en-US" sz="1400" b="1" kern="1200" dirty="0"/>
+          <a:endParaRPr lang="en-US" sz="1400" b="1" kern="1200" dirty="0" smtClean="0"/>
+        </a:p>
+        <a:p>
+          <a:pPr lvl="0" algn="l" defTabSz="622300">
+            <a:lnSpc>
+              <a:spcPct val="90000"/>
+            </a:lnSpc>
+            <a:spcBef>
+              <a:spcPct val="0"/>
+            </a:spcBef>
+            <a:spcAft>
+              <a:spcPct val="35000"/>
+            </a:spcAft>
+          </a:pPr>
+          <a:r>
+            <a:rPr lang="en-US" sz="1200" b="0" kern="1200" dirty="0" smtClean="0"/>
+            <a:t>-Needs VBA function</a:t>
+          </a:r>
+          <a:endParaRPr lang="en-US" sz="1200" b="0" kern="1200" dirty="0"/>
         </a:p>
       </dsp:txBody>
       <dsp:txXfrm>
@@ -6654,7 +6800,7 @@
           <a:p>
             <a:fld id="{0E86F4E9-671E-4C07-AE61-D9AD58733843}" type="datetimeFigureOut">
               <a:rPr lang="en-US" smtClean="0"/>
-              <a:t>25.04.2016</a:t>
+              <a:t>26.04.2016</a:t>
             </a:fld>
             <a:endParaRPr lang="en-US"/>
           </a:p>
@@ -6824,7 +6970,7 @@
           <a:p>
             <a:fld id="{0E86F4E9-671E-4C07-AE61-D9AD58733843}" type="datetimeFigureOut">
               <a:rPr lang="en-US" smtClean="0"/>
-              <a:t>25.04.2016</a:t>
+              <a:t>26.04.2016</a:t>
             </a:fld>
             <a:endParaRPr lang="en-US"/>
           </a:p>
@@ -7004,7 +7150,7 @@
           <a:p>
             <a:fld id="{0E86F4E9-671E-4C07-AE61-D9AD58733843}" type="datetimeFigureOut">
               <a:rPr lang="en-US" smtClean="0"/>
-              <a:t>25.04.2016</a:t>
+              <a:t>26.04.2016</a:t>
             </a:fld>
             <a:endParaRPr lang="en-US"/>
           </a:p>
@@ -7174,7 +7320,7 @@
           <a:p>
             <a:fld id="{0E86F4E9-671E-4C07-AE61-D9AD58733843}" type="datetimeFigureOut">
               <a:rPr lang="en-US" smtClean="0"/>
-              <a:t>25.04.2016</a:t>
+              <a:t>26.04.2016</a:t>
             </a:fld>
             <a:endParaRPr lang="en-US"/>
           </a:p>
@@ -7420,7 +7566,7 @@
           <a:p>
             <a:fld id="{0E86F4E9-671E-4C07-AE61-D9AD58733843}" type="datetimeFigureOut">
               <a:rPr lang="en-US" smtClean="0"/>
-              <a:t>25.04.2016</a:t>
+              <a:t>26.04.2016</a:t>
             </a:fld>
             <a:endParaRPr lang="en-US"/>
           </a:p>
@@ -7708,7 +7854,7 @@
           <a:p>
             <a:fld id="{0E86F4E9-671E-4C07-AE61-D9AD58733843}" type="datetimeFigureOut">
               <a:rPr lang="en-US" smtClean="0"/>
-              <a:t>25.04.2016</a:t>
+              <a:t>26.04.2016</a:t>
             </a:fld>
             <a:endParaRPr lang="en-US"/>
           </a:p>
@@ -8130,7 +8276,7 @@
           <a:p>
             <a:fld id="{0E86F4E9-671E-4C07-AE61-D9AD58733843}" type="datetimeFigureOut">
               <a:rPr lang="en-US" smtClean="0"/>
-              <a:t>25.04.2016</a:t>
+              <a:t>26.04.2016</a:t>
             </a:fld>
             <a:endParaRPr lang="en-US"/>
           </a:p>
@@ -8248,7 +8394,7 @@
           <a:p>
             <a:fld id="{0E86F4E9-671E-4C07-AE61-D9AD58733843}" type="datetimeFigureOut">
               <a:rPr lang="en-US" smtClean="0"/>
-              <a:t>25.04.2016</a:t>
+              <a:t>26.04.2016</a:t>
             </a:fld>
             <a:endParaRPr lang="en-US"/>
           </a:p>
@@ -8343,7 +8489,7 @@
           <a:p>
             <a:fld id="{0E86F4E9-671E-4C07-AE61-D9AD58733843}" type="datetimeFigureOut">
               <a:rPr lang="en-US" smtClean="0"/>
-              <a:t>25.04.2016</a:t>
+              <a:t>26.04.2016</a:t>
             </a:fld>
             <a:endParaRPr lang="en-US"/>
           </a:p>
@@ -8620,7 +8766,7 @@
           <a:p>
             <a:fld id="{0E86F4E9-671E-4C07-AE61-D9AD58733843}" type="datetimeFigureOut">
               <a:rPr lang="en-US" smtClean="0"/>
-              <a:t>25.04.2016</a:t>
+              <a:t>26.04.2016</a:t>
             </a:fld>
             <a:endParaRPr lang="en-US"/>
           </a:p>
@@ -8873,7 +9019,7 @@
           <a:p>
             <a:fld id="{0E86F4E9-671E-4C07-AE61-D9AD58733843}" type="datetimeFigureOut">
               <a:rPr lang="en-US" smtClean="0"/>
-              <a:t>25.04.2016</a:t>
+              <a:t>26.04.2016</a:t>
             </a:fld>
             <a:endParaRPr lang="en-US"/>
           </a:p>
@@ -9086,7 +9232,7 @@
           <a:p>
             <a:fld id="{0E86F4E9-671E-4C07-AE61-D9AD58733843}" type="datetimeFigureOut">
               <a:rPr lang="en-US" smtClean="0"/>
-              <a:t>25.04.2016</a:t>
+              <a:t>26.04.2016</a:t>
             </a:fld>
             <a:endParaRPr lang="en-US"/>
           </a:p>
@@ -9468,7 +9614,7 @@
           <p:nvPr>
             <p:extLst>
               <p:ext uri="{D42A27DB-BD31-4B8C-83A1-F6EECF244321}">
-                <p14:modId xmlns:p14="http://schemas.microsoft.com/office/powerpoint/2010/main" val="3769074869"/>
+                <p14:modId xmlns:p14="http://schemas.microsoft.com/office/powerpoint/2010/main" val="3371418897"/>
               </p:ext>
             </p:extLst>
           </p:nvPr>

</xml_diff>